<commit_message>
updated graphs for experiment 2
</commit_message>
<xml_diff>
--- a/Opentrons_experiments/BOTorch_optimization/Shivam_Report/Graphs.pptx
+++ b/Opentrons_experiments/BOTorch_optimization/Shivam_Report/Graphs.pptx
@@ -4311,7 +4311,7 @@
       </p:grpSpPr>
       <p:pic>
         <p:nvPicPr>
-          <p:cNvPr id="5" name="Picture 4" descr="A screenshot of a graph&#10;&#10;Description automatically generated with low confidence">
+          <p:cNvPr id="5" name="Picture 4">
             <a:extLst>
               <a:ext uri="{FF2B5EF4-FFF2-40B4-BE49-F238E27FC236}">
                 <a16:creationId xmlns:a16="http://schemas.microsoft.com/office/drawing/2014/main" id="{E4AEE1A4-545E-B5C5-AFF7-A1F299E9D393}"/>
@@ -4331,14 +4331,13 @@
               </a:ext>
             </a:extLst>
           </a:blip>
-          <a:stretch>
-            <a:fillRect/>
-          </a:stretch>
+          <a:srcRect/>
+          <a:stretch/>
         </p:blipFill>
         <p:spPr>
           <a:xfrm>
             <a:off x="266700" y="0"/>
-            <a:ext cx="11658600" cy="6858000"/>
+            <a:ext cx="11658600" cy="6857999"/>
           </a:xfrm>
           <a:prstGeom prst="rect">
             <a:avLst/>
@@ -4377,7 +4376,7 @@
       </p:grpSpPr>
       <p:pic>
         <p:nvPicPr>
-          <p:cNvPr id="3" name="Picture 2" descr="A picture containing diagram, text, line, plot&#10;&#10;Description automatically generated">
+          <p:cNvPr id="3" name="Picture 2">
             <a:extLst>
               <a:ext uri="{FF2B5EF4-FFF2-40B4-BE49-F238E27FC236}">
                 <a16:creationId xmlns:a16="http://schemas.microsoft.com/office/drawing/2014/main" id="{4D455D8F-3CE0-A86E-2D51-897DBDDF3079}"/>
@@ -4397,14 +4396,13 @@
               </a:ext>
             </a:extLst>
           </a:blip>
-          <a:stretch>
-            <a:fillRect/>
-          </a:stretch>
+          <a:srcRect/>
+          <a:stretch/>
         </p:blipFill>
         <p:spPr>
           <a:xfrm>
             <a:off x="266700" y="0"/>
-            <a:ext cx="11658600" cy="6858000"/>
+            <a:ext cx="11658600" cy="6857999"/>
           </a:xfrm>
           <a:prstGeom prst="rect">
             <a:avLst/>
@@ -4992,8 +4990,8 @@
             </p:pic>
           </mc:Fallback>
         </mc:AlternateContent>
-        <mc:AlternateContent xmlns:mc="http://schemas.openxmlformats.org/markup-compatibility/2006" xmlns:p14="http://schemas.microsoft.com/office/powerpoint/2010/main">
-          <mc:Choice Requires="p14">
+        <mc:AlternateContent xmlns:mc="http://schemas.openxmlformats.org/markup-compatibility/2006">
+          <mc:Choice xmlns:p14="http://schemas.microsoft.com/office/powerpoint/2010/main" Requires="p14">
             <p:contentPart p14:bwMode="auto" r:id="rId24">
               <p14:nvContentPartPr>
                 <p14:cNvPr id="18" name="Ink 17">
@@ -5012,7 +5010,7 @@
               </p14:xfrm>
             </p:contentPart>
           </mc:Choice>
-          <mc:Fallback xmlns="">
+          <mc:Fallback>
             <p:pic>
               <p:nvPicPr>
                 <p:cNvPr id="18" name="Ink 17">
@@ -5026,14 +5024,14 @@
                 <p:nvPr/>
               </p:nvPicPr>
               <p:blipFill>
-                <a:blip r:embed="rId8"/>
+                <a:blip r:embed="rId25"/>
                 <a:stretch>
                   <a:fillRect/>
                 </a:stretch>
               </p:blipFill>
               <p:spPr>
                 <a:xfrm>
-                  <a:off x="2099160" y="1701253"/>
+                  <a:off x="2099160" y="1700893"/>
                   <a:ext cx="18000" cy="18000"/>
                 </a:xfrm>
                 <a:prstGeom prst="rect">
@@ -5046,7 +5044,7 @@
       </p:grpSp>
       <mc:AlternateContent xmlns:mc="http://schemas.openxmlformats.org/markup-compatibility/2006" xmlns:p14="http://schemas.microsoft.com/office/powerpoint/2010/main">
         <mc:Choice Requires="p14">
-          <p:contentPart p14:bwMode="auto" r:id="rId25">
+          <p:contentPart p14:bwMode="auto" r:id="rId26">
             <p14:nvContentPartPr>
               <p14:cNvPr id="21" name="Ink 20">
                 <a:extLst>
@@ -5078,7 +5076,7 @@
               <p:nvPr/>
             </p:nvPicPr>
             <p:blipFill>
-              <a:blip r:embed="rId26"/>
+              <a:blip r:embed="rId27"/>
               <a:stretch>
                 <a:fillRect/>
               </a:stretch>
@@ -5097,7 +5095,7 @@
       </mc:AlternateContent>
       <mc:AlternateContent xmlns:mc="http://schemas.openxmlformats.org/markup-compatibility/2006" xmlns:p14="http://schemas.microsoft.com/office/powerpoint/2010/main">
         <mc:Choice Requires="p14">
-          <p:contentPart p14:bwMode="auto" r:id="rId27">
+          <p:contentPart p14:bwMode="auto" r:id="rId28">
             <p14:nvContentPartPr>
               <p14:cNvPr id="23" name="Ink 22">
                 <a:extLst>
@@ -5129,7 +5127,7 @@
               <p:nvPr/>
             </p:nvPicPr>
             <p:blipFill>
-              <a:blip r:embed="rId28"/>
+              <a:blip r:embed="rId29"/>
               <a:stretch>
                 <a:fillRect/>
               </a:stretch>
@@ -5148,7 +5146,7 @@
       </mc:AlternateContent>
       <mc:AlternateContent xmlns:mc="http://schemas.openxmlformats.org/markup-compatibility/2006" xmlns:p14="http://schemas.microsoft.com/office/powerpoint/2010/main">
         <mc:Choice Requires="p14">
-          <p:contentPart p14:bwMode="auto" r:id="rId29">
+          <p:contentPart p14:bwMode="auto" r:id="rId30">
             <p14:nvContentPartPr>
               <p14:cNvPr id="24" name="Ink 23">
                 <a:extLst>
@@ -5180,7 +5178,7 @@
               <p:nvPr/>
             </p:nvPicPr>
             <p:blipFill>
-              <a:blip r:embed="rId30"/>
+              <a:blip r:embed="rId31"/>
               <a:stretch>
                 <a:fillRect/>
               </a:stretch>
@@ -5199,7 +5197,7 @@
       </mc:AlternateContent>
       <mc:AlternateContent xmlns:mc="http://schemas.openxmlformats.org/markup-compatibility/2006" xmlns:p14="http://schemas.microsoft.com/office/powerpoint/2010/main">
         <mc:Choice Requires="p14">
-          <p:contentPart p14:bwMode="auto" r:id="rId31">
+          <p:contentPart p14:bwMode="auto" r:id="rId32">
             <p14:nvContentPartPr>
               <p14:cNvPr id="25" name="Ink 24">
                 <a:extLst>
@@ -5231,7 +5229,7 @@
               <p:nvPr/>
             </p:nvPicPr>
             <p:blipFill>
-              <a:blip r:embed="rId32"/>
+              <a:blip r:embed="rId33"/>
               <a:stretch>
                 <a:fillRect/>
               </a:stretch>
@@ -5250,7 +5248,7 @@
       </mc:AlternateContent>
       <mc:AlternateContent xmlns:mc="http://schemas.openxmlformats.org/markup-compatibility/2006" xmlns:p14="http://schemas.microsoft.com/office/powerpoint/2010/main">
         <mc:Choice Requires="p14">
-          <p:contentPart p14:bwMode="auto" r:id="rId33">
+          <p:contentPart p14:bwMode="auto" r:id="rId34">
             <p14:nvContentPartPr>
               <p14:cNvPr id="26" name="Ink 25">
                 <a:extLst>
@@ -5282,7 +5280,7 @@
               <p:nvPr/>
             </p:nvPicPr>
             <p:blipFill>
-              <a:blip r:embed="rId34"/>
+              <a:blip r:embed="rId35"/>
               <a:stretch>
                 <a:fillRect/>
               </a:stretch>
@@ -5301,7 +5299,7 @@
       </mc:AlternateContent>
       <mc:AlternateContent xmlns:mc="http://schemas.openxmlformats.org/markup-compatibility/2006" xmlns:p14="http://schemas.microsoft.com/office/powerpoint/2010/main">
         <mc:Choice Requires="p14">
-          <p:contentPart p14:bwMode="auto" r:id="rId35">
+          <p:contentPart p14:bwMode="auto" r:id="rId36">
             <p14:nvContentPartPr>
               <p14:cNvPr id="27" name="Ink 26">
                 <a:extLst>
@@ -5333,7 +5331,7 @@
               <p:nvPr/>
             </p:nvPicPr>
             <p:blipFill>
-              <a:blip r:embed="rId36"/>
+              <a:blip r:embed="rId37"/>
               <a:stretch>
                 <a:fillRect/>
               </a:stretch>
@@ -5352,7 +5350,7 @@
       </mc:AlternateContent>
       <mc:AlternateContent xmlns:mc="http://schemas.openxmlformats.org/markup-compatibility/2006" xmlns:p14="http://schemas.microsoft.com/office/powerpoint/2010/main">
         <mc:Choice Requires="p14">
-          <p:contentPart p14:bwMode="auto" r:id="rId37">
+          <p:contentPart p14:bwMode="auto" r:id="rId38">
             <p14:nvContentPartPr>
               <p14:cNvPr id="28" name="Ink 27">
                 <a:extLst>
@@ -5384,7 +5382,7 @@
               <p:nvPr/>
             </p:nvPicPr>
             <p:blipFill>
-              <a:blip r:embed="rId32"/>
+              <a:blip r:embed="rId33"/>
               <a:stretch>
                 <a:fillRect/>
               </a:stretch>
@@ -5403,7 +5401,7 @@
       </mc:AlternateContent>
       <mc:AlternateContent xmlns:mc="http://schemas.openxmlformats.org/markup-compatibility/2006" xmlns:p14="http://schemas.microsoft.com/office/powerpoint/2010/main">
         <mc:Choice Requires="p14">
-          <p:contentPart p14:bwMode="auto" r:id="rId38">
+          <p:contentPart p14:bwMode="auto" r:id="rId39">
             <p14:nvContentPartPr>
               <p14:cNvPr id="29" name="Ink 28">
                 <a:extLst>
@@ -5435,7 +5433,7 @@
               <p:nvPr/>
             </p:nvPicPr>
             <p:blipFill>
-              <a:blip r:embed="rId39"/>
+              <a:blip r:embed="rId40"/>
               <a:stretch>
                 <a:fillRect/>
               </a:stretch>
@@ -5454,7 +5452,7 @@
       </mc:AlternateContent>
       <mc:AlternateContent xmlns:mc="http://schemas.openxmlformats.org/markup-compatibility/2006" xmlns:p14="http://schemas.microsoft.com/office/powerpoint/2010/main">
         <mc:Choice Requires="p14">
-          <p:contentPart p14:bwMode="auto" r:id="rId40">
+          <p:contentPart p14:bwMode="auto" r:id="rId41">
             <p14:nvContentPartPr>
               <p14:cNvPr id="30" name="Ink 29">
                 <a:extLst>
@@ -5486,7 +5484,7 @@
               <p:nvPr/>
             </p:nvPicPr>
             <p:blipFill>
-              <a:blip r:embed="rId41"/>
+              <a:blip r:embed="rId42"/>
               <a:stretch>
                 <a:fillRect/>
               </a:stretch>
@@ -5505,7 +5503,7 @@
       </mc:AlternateContent>
       <mc:AlternateContent xmlns:mc="http://schemas.openxmlformats.org/markup-compatibility/2006" xmlns:p14="http://schemas.microsoft.com/office/powerpoint/2010/main">
         <mc:Choice Requires="p14">
-          <p:contentPart p14:bwMode="auto" r:id="rId42">
+          <p:contentPart p14:bwMode="auto" r:id="rId43">
             <p14:nvContentPartPr>
               <p14:cNvPr id="31" name="Ink 30">
                 <a:extLst>
@@ -5537,7 +5535,7 @@
               <p:nvPr/>
             </p:nvPicPr>
             <p:blipFill>
-              <a:blip r:embed="rId32"/>
+              <a:blip r:embed="rId33"/>
               <a:stretch>
                 <a:fillRect/>
               </a:stretch>
@@ -5556,7 +5554,7 @@
       </mc:AlternateContent>
       <mc:AlternateContent xmlns:mc="http://schemas.openxmlformats.org/markup-compatibility/2006" xmlns:p14="http://schemas.microsoft.com/office/powerpoint/2010/main">
         <mc:Choice Requires="p14">
-          <p:contentPart p14:bwMode="auto" r:id="rId43">
+          <p:contentPart p14:bwMode="auto" r:id="rId44">
             <p14:nvContentPartPr>
               <p14:cNvPr id="32" name="Ink 31">
                 <a:extLst>
@@ -5588,7 +5586,7 @@
               <p:nvPr/>
             </p:nvPicPr>
             <p:blipFill>
-              <a:blip r:embed="rId28"/>
+              <a:blip r:embed="rId29"/>
               <a:stretch>
                 <a:fillRect/>
               </a:stretch>
@@ -5625,9 +5623,9 @@
             <a:chExt cx="140400" cy="112680"/>
           </a:xfrm>
         </p:grpSpPr>
-        <mc:AlternateContent xmlns:mc="http://schemas.openxmlformats.org/markup-compatibility/2006">
-          <mc:Choice xmlns:p14="http://schemas.microsoft.com/office/powerpoint/2010/main" Requires="p14">
-            <p:contentPart p14:bwMode="auto" r:id="rId44">
+        <mc:AlternateContent xmlns:mc="http://schemas.openxmlformats.org/markup-compatibility/2006" xmlns:p14="http://schemas.microsoft.com/office/powerpoint/2010/main">
+          <mc:Choice Requires="p14">
+            <p:contentPart p14:bwMode="auto" r:id="rId45">
               <p14:nvContentPartPr>
                 <p14:cNvPr id="33" name="Ink 32">
                   <a:extLst>
@@ -5645,7 +5643,7 @@
               </p14:xfrm>
             </p:contentPart>
           </mc:Choice>
-          <mc:Fallback>
+          <mc:Fallback xmlns="">
             <p:pic>
               <p:nvPicPr>
                 <p:cNvPr id="33" name="Ink 32">
@@ -5659,7 +5657,7 @@
                 <p:nvPr/>
               </p:nvPicPr>
               <p:blipFill>
-                <a:blip r:embed="rId45"/>
+                <a:blip r:embed="rId46"/>
                 <a:stretch>
                   <a:fillRect/>
                 </a:stretch>
@@ -5676,9 +5674,9 @@
             </p:pic>
           </mc:Fallback>
         </mc:AlternateContent>
-        <mc:AlternateContent xmlns:mc="http://schemas.openxmlformats.org/markup-compatibility/2006">
-          <mc:Choice xmlns:p14="http://schemas.microsoft.com/office/powerpoint/2010/main" Requires="p14">
-            <p:contentPart p14:bwMode="auto" r:id="rId46">
+        <mc:AlternateContent xmlns:mc="http://schemas.openxmlformats.org/markup-compatibility/2006" xmlns:p14="http://schemas.microsoft.com/office/powerpoint/2010/main">
+          <mc:Choice Requires="p14">
+            <p:contentPart p14:bwMode="auto" r:id="rId47">
               <p14:nvContentPartPr>
                 <p14:cNvPr id="34" name="Ink 33">
                   <a:extLst>
@@ -5696,7 +5694,7 @@
               </p14:xfrm>
             </p:contentPart>
           </mc:Choice>
-          <mc:Fallback>
+          <mc:Fallback xmlns="">
             <p:pic>
               <p:nvPicPr>
                 <p:cNvPr id="34" name="Ink 33">
@@ -5710,7 +5708,7 @@
                 <p:nvPr/>
               </p:nvPicPr>
               <p:blipFill>
-                <a:blip r:embed="rId45"/>
+                <a:blip r:embed="rId46"/>
                 <a:stretch>
                   <a:fillRect/>
                 </a:stretch>
@@ -5729,7 +5727,7 @@
         </mc:AlternateContent>
         <mc:AlternateContent xmlns:mc="http://schemas.openxmlformats.org/markup-compatibility/2006" xmlns:p14="http://schemas.microsoft.com/office/powerpoint/2010/main">
           <mc:Choice Requires="p14">
-            <p:contentPart p14:bwMode="auto" r:id="rId47">
+            <p:contentPart p14:bwMode="auto" r:id="rId48">
               <p14:nvContentPartPr>
                 <p14:cNvPr id="35" name="Ink 34">
                   <a:extLst>
@@ -5761,7 +5759,7 @@
                 <p:nvPr/>
               </p:nvPicPr>
               <p:blipFill>
-                <a:blip r:embed="rId48"/>
+                <a:blip r:embed="rId49"/>
                 <a:stretch>
                   <a:fillRect/>
                 </a:stretch>
@@ -5780,7 +5778,7 @@
         </mc:AlternateContent>
         <mc:AlternateContent xmlns:mc="http://schemas.openxmlformats.org/markup-compatibility/2006" xmlns:p14="http://schemas.microsoft.com/office/powerpoint/2010/main">
           <mc:Choice Requires="p14">
-            <p:contentPart p14:bwMode="auto" r:id="rId49">
+            <p:contentPart p14:bwMode="auto" r:id="rId50">
               <p14:nvContentPartPr>
                 <p14:cNvPr id="36" name="Ink 35">
                   <a:extLst>
@@ -5812,7 +5810,7 @@
                 <p:nvPr/>
               </p:nvPicPr>
               <p:blipFill>
-                <a:blip r:embed="rId48"/>
+                <a:blip r:embed="rId49"/>
                 <a:stretch>
                   <a:fillRect/>
                 </a:stretch>
@@ -5831,7 +5829,7 @@
         </mc:AlternateContent>
         <mc:AlternateContent xmlns:mc="http://schemas.openxmlformats.org/markup-compatibility/2006" xmlns:p14="http://schemas.microsoft.com/office/powerpoint/2010/main">
           <mc:Choice Requires="p14">
-            <p:contentPart p14:bwMode="auto" r:id="rId50">
+            <p:contentPart p14:bwMode="auto" r:id="rId51">
               <p14:nvContentPartPr>
                 <p14:cNvPr id="37" name="Ink 36">
                   <a:extLst>
@@ -5863,7 +5861,7 @@
                 <p:nvPr/>
               </p:nvPicPr>
               <p:blipFill>
-                <a:blip r:embed="rId48"/>
+                <a:blip r:embed="rId49"/>
                 <a:stretch>
                   <a:fillRect/>
                 </a:stretch>
@@ -5882,7 +5880,7 @@
         </mc:AlternateContent>
         <mc:AlternateContent xmlns:mc="http://schemas.openxmlformats.org/markup-compatibility/2006" xmlns:p14="http://schemas.microsoft.com/office/powerpoint/2010/main">
           <mc:Choice Requires="p14">
-            <p:contentPart p14:bwMode="auto" r:id="rId51">
+            <p:contentPart p14:bwMode="auto" r:id="rId52">
               <p14:nvContentPartPr>
                 <p14:cNvPr id="38" name="Ink 37">
                   <a:extLst>
@@ -5914,7 +5912,7 @@
                 <p:nvPr/>
               </p:nvPicPr>
               <p:blipFill>
-                <a:blip r:embed="rId52"/>
+                <a:blip r:embed="rId53"/>
                 <a:stretch>
                   <a:fillRect/>
                 </a:stretch>
@@ -5931,9 +5929,9 @@
             </p:pic>
           </mc:Fallback>
         </mc:AlternateContent>
-        <mc:AlternateContent xmlns:mc="http://schemas.openxmlformats.org/markup-compatibility/2006" xmlns:p14="http://schemas.microsoft.com/office/powerpoint/2010/main">
-          <mc:Choice Requires="p14">
-            <p:contentPart p14:bwMode="auto" r:id="rId53">
+        <mc:AlternateContent xmlns:mc="http://schemas.openxmlformats.org/markup-compatibility/2006">
+          <mc:Choice xmlns:p14="http://schemas.microsoft.com/office/powerpoint/2010/main" Requires="p14">
+            <p:contentPart p14:bwMode="auto" r:id="rId54">
               <p14:nvContentPartPr>
                 <p14:cNvPr id="39" name="Ink 38">
                   <a:extLst>
@@ -5951,7 +5949,7 @@
               </p14:xfrm>
             </p:contentPart>
           </mc:Choice>
-          <mc:Fallback xmlns="">
+          <mc:Fallback>
             <p:pic>
               <p:nvPicPr>
                 <p:cNvPr id="39" name="Ink 38">
@@ -5965,15 +5963,15 @@
                 <p:nvPr/>
               </p:nvPicPr>
               <p:blipFill>
-                <a:blip r:embed="rId54"/>
+                <a:blip r:embed="rId55"/>
                 <a:stretch>
                   <a:fillRect/>
                 </a:stretch>
               </p:blipFill>
               <p:spPr>
                 <a:xfrm>
-                  <a:off x="6690147" y="1680550"/>
-                  <a:ext cx="24120" cy="21600"/>
+                  <a:off x="6690147" y="1681300"/>
+                  <a:ext cx="24120" cy="20130"/>
                 </a:xfrm>
                 <a:prstGeom prst="rect">
                   <a:avLst/>
@@ -5984,7 +5982,7 @@
         </mc:AlternateContent>
         <mc:AlternateContent xmlns:mc="http://schemas.openxmlformats.org/markup-compatibility/2006" xmlns:p14="http://schemas.microsoft.com/office/powerpoint/2010/main">
           <mc:Choice Requires="p14">
-            <p:contentPart p14:bwMode="auto" r:id="rId55">
+            <p:contentPart p14:bwMode="auto" r:id="rId56">
               <p14:nvContentPartPr>
                 <p14:cNvPr id="40" name="Ink 39">
                   <a:extLst>
@@ -6016,7 +6014,7 @@
                 <p:nvPr/>
               </p:nvPicPr>
               <p:blipFill>
-                <a:blip r:embed="rId56"/>
+                <a:blip r:embed="rId57"/>
                 <a:stretch>
                   <a:fillRect/>
                 </a:stretch>
@@ -6035,7 +6033,7 @@
         </mc:AlternateContent>
         <mc:AlternateContent xmlns:mc="http://schemas.openxmlformats.org/markup-compatibility/2006" xmlns:p14="http://schemas.microsoft.com/office/powerpoint/2010/main">
           <mc:Choice Requires="p14">
-            <p:contentPart p14:bwMode="auto" r:id="rId57">
+            <p:contentPart p14:bwMode="auto" r:id="rId58">
               <p14:nvContentPartPr>
                 <p14:cNvPr id="41" name="Ink 40">
                   <a:extLst>
@@ -6067,7 +6065,7 @@
                 <p:nvPr/>
               </p:nvPicPr>
               <p:blipFill>
-                <a:blip r:embed="rId58"/>
+                <a:blip r:embed="rId59"/>
                 <a:stretch>
                   <a:fillRect/>
                 </a:stretch>
@@ -6086,7 +6084,7 @@
         </mc:AlternateContent>
         <mc:AlternateContent xmlns:mc="http://schemas.openxmlformats.org/markup-compatibility/2006" xmlns:p14="http://schemas.microsoft.com/office/powerpoint/2010/main">
           <mc:Choice Requires="p14">
-            <p:contentPart p14:bwMode="auto" r:id="rId59">
+            <p:contentPart p14:bwMode="auto" r:id="rId60">
               <p14:nvContentPartPr>
                 <p14:cNvPr id="42" name="Ink 41">
                   <a:extLst>
@@ -6118,7 +6116,7 @@
                 <p:nvPr/>
               </p:nvPicPr>
               <p:blipFill>
-                <a:blip r:embed="rId60"/>
+                <a:blip r:embed="rId61"/>
                 <a:stretch>
                   <a:fillRect/>
                 </a:stretch>
@@ -6135,9 +6133,9 @@
             </p:pic>
           </mc:Fallback>
         </mc:AlternateContent>
-        <mc:AlternateContent xmlns:mc="http://schemas.openxmlformats.org/markup-compatibility/2006" xmlns:p14="http://schemas.microsoft.com/office/powerpoint/2010/main">
-          <mc:Choice Requires="p14">
-            <p:contentPart p14:bwMode="auto" r:id="rId61">
+        <mc:AlternateContent xmlns:mc="http://schemas.openxmlformats.org/markup-compatibility/2006">
+          <mc:Choice xmlns:p14="http://schemas.microsoft.com/office/powerpoint/2010/main" Requires="p14">
+            <p:contentPart p14:bwMode="auto" r:id="rId62">
               <p14:nvContentPartPr>
                 <p14:cNvPr id="43" name="Ink 42">
                   <a:extLst>
@@ -6155,7 +6153,7 @@
               </p14:xfrm>
             </p:contentPart>
           </mc:Choice>
-          <mc:Fallback xmlns="">
+          <mc:Fallback>
             <p:pic>
               <p:nvPicPr>
                 <p:cNvPr id="43" name="Ink 42">
@@ -6169,14 +6167,14 @@
                 <p:nvPr/>
               </p:nvPicPr>
               <p:blipFill>
-                <a:blip r:embed="rId48"/>
+                <a:blip r:embed="rId63"/>
                 <a:stretch>
                   <a:fillRect/>
                 </a:stretch>
               </p:blipFill>
               <p:spPr>
                 <a:xfrm>
-                  <a:off x="6696627" y="1582630"/>
+                  <a:off x="6696267" y="1582630"/>
                   <a:ext cx="18000" cy="18000"/>
                 </a:xfrm>
                 <a:prstGeom prst="rect">
@@ -6232,7 +6230,7 @@
           <p:nvPr>
             <p:extLst>
               <p:ext uri="{D42A27DB-BD31-4B8C-83A1-F6EECF244321}">
-                <p14:modId xmlns:p14="http://schemas.microsoft.com/office/powerpoint/2010/main" val="3211558656"/>
+                <p14:modId xmlns:p14="http://schemas.microsoft.com/office/powerpoint/2010/main" val="3951261903"/>
               </p:ext>
             </p:extLst>
           </p:nvPr>
@@ -6928,8 +6926,8 @@
                     <a:p>
                       <a:pPr algn="l"/>
                       <a:r>
-                        <a:rPr lang="en-SG" sz="1600"/>
-                        <a:t>28.871429</a:t>
+                        <a:rPr lang="en-SG" sz="1600" dirty="0"/>
+                        <a:t>	</a:t>
                       </a:r>
                     </a:p>
                   </a:txBody>

</xml_diff>